<commit_message>
Carga de codigo 27/10/2022
Carga de codigo
</commit_message>
<xml_diff>
--- a/imagenes/Botones.pptx
+++ b/imagenes/Botones.pptx
@@ -307,7 +307,7 @@
           <a:p>
             <a:fld id="{9BF2B8FD-2FE0-4DE2-9F61-7CBDFB79DE84}" type="datetimeFigureOut">
               <a:rPr lang="es-ES" smtClean="0"/>
-              <a:t>07/09/2022</a:t>
+              <a:t>25/10/2022</a:t>
             </a:fld>
             <a:endParaRPr lang="es-ES"/>
           </a:p>
@@ -477,7 +477,7 @@
           <a:p>
             <a:fld id="{9BF2B8FD-2FE0-4DE2-9F61-7CBDFB79DE84}" type="datetimeFigureOut">
               <a:rPr lang="es-ES" smtClean="0"/>
-              <a:t>07/09/2022</a:t>
+              <a:t>25/10/2022</a:t>
             </a:fld>
             <a:endParaRPr lang="es-ES"/>
           </a:p>
@@ -657,7 +657,7 @@
           <a:p>
             <a:fld id="{9BF2B8FD-2FE0-4DE2-9F61-7CBDFB79DE84}" type="datetimeFigureOut">
               <a:rPr lang="es-ES" smtClean="0"/>
-              <a:t>07/09/2022</a:t>
+              <a:t>25/10/2022</a:t>
             </a:fld>
             <a:endParaRPr lang="es-ES"/>
           </a:p>
@@ -827,7 +827,7 @@
           <a:p>
             <a:fld id="{9BF2B8FD-2FE0-4DE2-9F61-7CBDFB79DE84}" type="datetimeFigureOut">
               <a:rPr lang="es-ES" smtClean="0"/>
-              <a:t>07/09/2022</a:t>
+              <a:t>25/10/2022</a:t>
             </a:fld>
             <a:endParaRPr lang="es-ES"/>
           </a:p>
@@ -1073,7 +1073,7 @@
           <a:p>
             <a:fld id="{9BF2B8FD-2FE0-4DE2-9F61-7CBDFB79DE84}" type="datetimeFigureOut">
               <a:rPr lang="es-ES" smtClean="0"/>
-              <a:t>07/09/2022</a:t>
+              <a:t>25/10/2022</a:t>
             </a:fld>
             <a:endParaRPr lang="es-ES"/>
           </a:p>
@@ -1361,7 +1361,7 @@
           <a:p>
             <a:fld id="{9BF2B8FD-2FE0-4DE2-9F61-7CBDFB79DE84}" type="datetimeFigureOut">
               <a:rPr lang="es-ES" smtClean="0"/>
-              <a:t>07/09/2022</a:t>
+              <a:t>25/10/2022</a:t>
             </a:fld>
             <a:endParaRPr lang="es-ES"/>
           </a:p>
@@ -1783,7 +1783,7 @@
           <a:p>
             <a:fld id="{9BF2B8FD-2FE0-4DE2-9F61-7CBDFB79DE84}" type="datetimeFigureOut">
               <a:rPr lang="es-ES" smtClean="0"/>
-              <a:t>07/09/2022</a:t>
+              <a:t>25/10/2022</a:t>
             </a:fld>
             <a:endParaRPr lang="es-ES"/>
           </a:p>
@@ -1901,7 +1901,7 @@
           <a:p>
             <a:fld id="{9BF2B8FD-2FE0-4DE2-9F61-7CBDFB79DE84}" type="datetimeFigureOut">
               <a:rPr lang="es-ES" smtClean="0"/>
-              <a:t>07/09/2022</a:t>
+              <a:t>25/10/2022</a:t>
             </a:fld>
             <a:endParaRPr lang="es-ES"/>
           </a:p>
@@ -1996,7 +1996,7 @@
           <a:p>
             <a:fld id="{9BF2B8FD-2FE0-4DE2-9F61-7CBDFB79DE84}" type="datetimeFigureOut">
               <a:rPr lang="es-ES" smtClean="0"/>
-              <a:t>07/09/2022</a:t>
+              <a:t>25/10/2022</a:t>
             </a:fld>
             <a:endParaRPr lang="es-ES"/>
           </a:p>
@@ -2273,7 +2273,7 @@
           <a:p>
             <a:fld id="{9BF2B8FD-2FE0-4DE2-9F61-7CBDFB79DE84}" type="datetimeFigureOut">
               <a:rPr lang="es-ES" smtClean="0"/>
-              <a:t>07/09/2022</a:t>
+              <a:t>25/10/2022</a:t>
             </a:fld>
             <a:endParaRPr lang="es-ES"/>
           </a:p>
@@ -2526,7 +2526,7 @@
           <a:p>
             <a:fld id="{9BF2B8FD-2FE0-4DE2-9F61-7CBDFB79DE84}" type="datetimeFigureOut">
               <a:rPr lang="es-ES" smtClean="0"/>
-              <a:t>07/09/2022</a:t>
+              <a:t>25/10/2022</a:t>
             </a:fld>
             <a:endParaRPr lang="es-ES"/>
           </a:p>
@@ -2739,7 +2739,7 @@
           <a:p>
             <a:fld id="{9BF2B8FD-2FE0-4DE2-9F61-7CBDFB79DE84}" type="datetimeFigureOut">
               <a:rPr lang="es-ES" smtClean="0"/>
-              <a:t>07/09/2022</a:t>
+              <a:t>25/10/2022</a:t>
             </a:fld>
             <a:endParaRPr lang="es-ES"/>
           </a:p>
@@ -11312,6 +11312,105 @@
           </p:spPr>
         </p:pic>
       </p:grpSp>
+      <p:grpSp>
+        <p:nvGrpSpPr>
+          <p:cNvPr id="9" name="Grupo 8"/>
+          <p:cNvGrpSpPr/>
+          <p:nvPr/>
+        </p:nvGrpSpPr>
+        <p:grpSpPr>
+          <a:xfrm>
+            <a:off x="2947870" y="1087051"/>
+            <a:ext cx="982681" cy="366891"/>
+            <a:chOff x="2947870" y="1087051"/>
+            <a:chExt cx="982681" cy="366891"/>
+          </a:xfrm>
+        </p:grpSpPr>
+        <p:pic>
+          <p:nvPicPr>
+            <p:cNvPr id="7" name="Imagen 6"/>
+            <p:cNvPicPr>
+              <a:picLocks noChangeAspect="1"/>
+            </p:cNvPicPr>
+            <p:nvPr/>
+          </p:nvPicPr>
+          <p:blipFill>
+            <a:blip r:embed="rId10" cstate="print">
+              <a:extLst>
+                <a:ext uri="{28A0092B-C50C-407E-A947-70E740481C1C}">
+                  <a14:useLocalDpi xmlns:a14="http://schemas.microsoft.com/office/drawing/2010/main" val="0"/>
+                </a:ext>
+              </a:extLst>
+            </a:blip>
+            <a:stretch>
+              <a:fillRect/>
+            </a:stretch>
+          </p:blipFill>
+          <p:spPr>
+            <a:xfrm>
+              <a:off x="2947870" y="1087051"/>
+              <a:ext cx="982681" cy="366891"/>
+            </a:xfrm>
+            <a:prstGeom prst="rect">
+              <a:avLst/>
+            </a:prstGeom>
+          </p:spPr>
+        </p:pic>
+        <p:sp>
+          <p:nvSpPr>
+            <p:cNvPr id="25" name="5 CuadroTexto"/>
+            <p:cNvSpPr txBox="1"/>
+            <p:nvPr/>
+          </p:nvSpPr>
+          <p:spPr>
+            <a:xfrm>
+              <a:off x="2952159" y="1089359"/>
+              <a:ext cx="651799" cy="209848"/>
+            </a:xfrm>
+            <a:prstGeom prst="rect">
+              <a:avLst/>
+            </a:prstGeom>
+            <a:solidFill>
+              <a:schemeClr val="bg1">
+                <a:lumMod val="85000"/>
+              </a:schemeClr>
+            </a:solidFill>
+          </p:spPr>
+          <p:txBody>
+            <a:bodyPr wrap="none" rtlCol="0">
+              <a:spAutoFit/>
+            </a:bodyPr>
+            <a:lstStyle/>
+            <a:p>
+              <a:pPr algn="ctr"/>
+              <a:r>
+                <a:rPr lang="es-ES" sz="1050" dirty="0" smtClean="0">
+                  <a:solidFill>
+                    <a:srgbClr val="C00000"/>
+                  </a:solidFill>
+                </a:rPr>
+                <a:t>Crono </a:t>
+              </a:r>
+              <a:r>
+                <a:rPr lang="es-ES" sz="1050" dirty="0" err="1" smtClean="0">
+                  <a:solidFill>
+                    <a:srgbClr val="C00000"/>
+                  </a:solidFill>
+                </a:rPr>
+                <a:t>Mtto</a:t>
+              </a:r>
+              <a:r>
+                <a:rPr lang="es-ES" sz="1050" dirty="0" smtClean="0">
+                  <a:solidFill>
+                    <a:srgbClr val="C00000"/>
+                  </a:solidFill>
+                </a:rPr>
+                <a:t>.</a:t>
+              </a:r>
+            </a:p>
+          </p:txBody>
+        </p:sp>
+      </p:grpSp>
     </p:spTree>
     <p:extLst>
       <p:ext uri="{BB962C8B-B14F-4D97-AF65-F5344CB8AC3E}">

</xml_diff>

<commit_message>
Carga de codigo 21/11/2022
</commit_message>
<xml_diff>
--- a/imagenes/Botones.pptx
+++ b/imagenes/Botones.pptx
@@ -307,7 +307,7 @@
           <a:p>
             <a:fld id="{9BF2B8FD-2FE0-4DE2-9F61-7CBDFB79DE84}" type="datetimeFigureOut">
               <a:rPr lang="es-ES" smtClean="0"/>
-              <a:t>25/10/2022</a:t>
+              <a:t>18/11/2022</a:t>
             </a:fld>
             <a:endParaRPr lang="es-ES"/>
           </a:p>
@@ -477,7 +477,7 @@
           <a:p>
             <a:fld id="{9BF2B8FD-2FE0-4DE2-9F61-7CBDFB79DE84}" type="datetimeFigureOut">
               <a:rPr lang="es-ES" smtClean="0"/>
-              <a:t>25/10/2022</a:t>
+              <a:t>18/11/2022</a:t>
             </a:fld>
             <a:endParaRPr lang="es-ES"/>
           </a:p>
@@ -657,7 +657,7 @@
           <a:p>
             <a:fld id="{9BF2B8FD-2FE0-4DE2-9F61-7CBDFB79DE84}" type="datetimeFigureOut">
               <a:rPr lang="es-ES" smtClean="0"/>
-              <a:t>25/10/2022</a:t>
+              <a:t>18/11/2022</a:t>
             </a:fld>
             <a:endParaRPr lang="es-ES"/>
           </a:p>
@@ -827,7 +827,7 @@
           <a:p>
             <a:fld id="{9BF2B8FD-2FE0-4DE2-9F61-7CBDFB79DE84}" type="datetimeFigureOut">
               <a:rPr lang="es-ES" smtClean="0"/>
-              <a:t>25/10/2022</a:t>
+              <a:t>18/11/2022</a:t>
             </a:fld>
             <a:endParaRPr lang="es-ES"/>
           </a:p>
@@ -1073,7 +1073,7 @@
           <a:p>
             <a:fld id="{9BF2B8FD-2FE0-4DE2-9F61-7CBDFB79DE84}" type="datetimeFigureOut">
               <a:rPr lang="es-ES" smtClean="0"/>
-              <a:t>25/10/2022</a:t>
+              <a:t>18/11/2022</a:t>
             </a:fld>
             <a:endParaRPr lang="es-ES"/>
           </a:p>
@@ -1361,7 +1361,7 @@
           <a:p>
             <a:fld id="{9BF2B8FD-2FE0-4DE2-9F61-7CBDFB79DE84}" type="datetimeFigureOut">
               <a:rPr lang="es-ES" smtClean="0"/>
-              <a:t>25/10/2022</a:t>
+              <a:t>18/11/2022</a:t>
             </a:fld>
             <a:endParaRPr lang="es-ES"/>
           </a:p>
@@ -1783,7 +1783,7 @@
           <a:p>
             <a:fld id="{9BF2B8FD-2FE0-4DE2-9F61-7CBDFB79DE84}" type="datetimeFigureOut">
               <a:rPr lang="es-ES" smtClean="0"/>
-              <a:t>25/10/2022</a:t>
+              <a:t>18/11/2022</a:t>
             </a:fld>
             <a:endParaRPr lang="es-ES"/>
           </a:p>
@@ -1901,7 +1901,7 @@
           <a:p>
             <a:fld id="{9BF2B8FD-2FE0-4DE2-9F61-7CBDFB79DE84}" type="datetimeFigureOut">
               <a:rPr lang="es-ES" smtClean="0"/>
-              <a:t>25/10/2022</a:t>
+              <a:t>18/11/2022</a:t>
             </a:fld>
             <a:endParaRPr lang="es-ES"/>
           </a:p>
@@ -1996,7 +1996,7 @@
           <a:p>
             <a:fld id="{9BF2B8FD-2FE0-4DE2-9F61-7CBDFB79DE84}" type="datetimeFigureOut">
               <a:rPr lang="es-ES" smtClean="0"/>
-              <a:t>25/10/2022</a:t>
+              <a:t>18/11/2022</a:t>
             </a:fld>
             <a:endParaRPr lang="es-ES"/>
           </a:p>
@@ -2273,7 +2273,7 @@
           <a:p>
             <a:fld id="{9BF2B8FD-2FE0-4DE2-9F61-7CBDFB79DE84}" type="datetimeFigureOut">
               <a:rPr lang="es-ES" smtClean="0"/>
-              <a:t>25/10/2022</a:t>
+              <a:t>18/11/2022</a:t>
             </a:fld>
             <a:endParaRPr lang="es-ES"/>
           </a:p>
@@ -2526,7 +2526,7 @@
           <a:p>
             <a:fld id="{9BF2B8FD-2FE0-4DE2-9F61-7CBDFB79DE84}" type="datetimeFigureOut">
               <a:rPr lang="es-ES" smtClean="0"/>
-              <a:t>25/10/2022</a:t>
+              <a:t>18/11/2022</a:t>
             </a:fld>
             <a:endParaRPr lang="es-ES"/>
           </a:p>
@@ -2739,7 +2739,7 @@
           <a:p>
             <a:fld id="{9BF2B8FD-2FE0-4DE2-9F61-7CBDFB79DE84}" type="datetimeFigureOut">
               <a:rPr lang="es-ES" smtClean="0"/>
-              <a:t>25/10/2022</a:t>
+              <a:t>18/11/2022</a:t>
             </a:fld>
             <a:endParaRPr lang="es-ES"/>
           </a:p>
@@ -11411,6 +11411,343 @@
           </p:txBody>
         </p:sp>
       </p:grpSp>
+      <p:grpSp>
+        <p:nvGrpSpPr>
+          <p:cNvPr id="30" name="Grupo 29"/>
+          <p:cNvGrpSpPr/>
+          <p:nvPr/>
+        </p:nvGrpSpPr>
+        <p:grpSpPr>
+          <a:xfrm>
+            <a:off x="1906605" y="2227619"/>
+            <a:ext cx="812019" cy="415498"/>
+            <a:chOff x="1906605" y="2227619"/>
+            <a:chExt cx="812019" cy="415498"/>
+          </a:xfrm>
+        </p:grpSpPr>
+        <p:pic>
+          <p:nvPicPr>
+            <p:cNvPr id="27" name="23 Imagen"/>
+            <p:cNvPicPr>
+              <a:picLocks noChangeAspect="1"/>
+            </p:cNvPicPr>
+            <p:nvPr/>
+          </p:nvPicPr>
+          <p:blipFill>
+            <a:blip r:embed="rId7">
+              <a:extLst>
+                <a:ext uri="{28A0092B-C50C-407E-A947-70E740481C1C}">
+                  <a14:useLocalDpi xmlns:a14="http://schemas.microsoft.com/office/drawing/2010/main" val="0"/>
+                </a:ext>
+              </a:extLst>
+            </a:blip>
+            <a:stretch>
+              <a:fillRect/>
+            </a:stretch>
+          </p:blipFill>
+          <p:spPr>
+            <a:xfrm>
+              <a:off x="1906605" y="2255757"/>
+              <a:ext cx="772624" cy="371475"/>
+            </a:xfrm>
+            <a:prstGeom prst="rect">
+              <a:avLst/>
+            </a:prstGeom>
+          </p:spPr>
+        </p:pic>
+        <p:sp>
+          <p:nvSpPr>
+            <p:cNvPr id="28" name="Flecha derecha 27"/>
+            <p:cNvSpPr/>
+            <p:nvPr/>
+          </p:nvSpPr>
+          <p:spPr>
+            <a:xfrm rot="5400000">
+              <a:off x="1928883" y="2331930"/>
+              <a:ext cx="234699" cy="206877"/>
+            </a:xfrm>
+            <a:prstGeom prst="rightArrow">
+              <a:avLst/>
+            </a:prstGeom>
+            <a:solidFill>
+              <a:srgbClr val="00B050"/>
+            </a:solidFill>
+            <a:ln>
+              <a:solidFill>
+                <a:schemeClr val="bg1">
+                  <a:lumMod val="95000"/>
+                </a:schemeClr>
+              </a:solidFill>
+            </a:ln>
+          </p:spPr>
+          <p:style>
+            <a:lnRef idx="2">
+              <a:schemeClr val="accent1">
+                <a:shade val="50000"/>
+              </a:schemeClr>
+            </a:lnRef>
+            <a:fillRef idx="1">
+              <a:schemeClr val="accent1"/>
+            </a:fillRef>
+            <a:effectRef idx="0">
+              <a:schemeClr val="accent1"/>
+            </a:effectRef>
+            <a:fontRef idx="minor">
+              <a:schemeClr val="lt1"/>
+            </a:fontRef>
+          </p:style>
+          <p:txBody>
+            <a:bodyPr rtlCol="0" anchor="ctr"/>
+            <a:lstStyle/>
+            <a:p>
+              <a:pPr algn="ctr"/>
+              <a:endParaRPr lang="es-ES"/>
+            </a:p>
+          </p:txBody>
+        </p:sp>
+        <p:sp>
+          <p:nvSpPr>
+            <p:cNvPr id="29" name="5 CuadroTexto"/>
+            <p:cNvSpPr txBox="1"/>
+            <p:nvPr/>
+          </p:nvSpPr>
+          <p:spPr>
+            <a:xfrm>
+              <a:off x="2110765" y="2227619"/>
+              <a:ext cx="607859" cy="415498"/>
+            </a:xfrm>
+            <a:prstGeom prst="rect">
+              <a:avLst/>
+            </a:prstGeom>
+            <a:noFill/>
+          </p:spPr>
+          <p:txBody>
+            <a:bodyPr wrap="none" rtlCol="0">
+              <a:spAutoFit/>
+            </a:bodyPr>
+            <a:lstStyle/>
+            <a:p>
+              <a:pPr algn="ctr"/>
+              <a:r>
+                <a:rPr lang="es-ES" sz="1050" dirty="0" smtClean="0">
+                  <a:solidFill>
+                    <a:schemeClr val="accent5">
+                      <a:lumMod val="40000"/>
+                      <a:lumOff val="60000"/>
+                    </a:schemeClr>
+                  </a:solidFill>
+                </a:rPr>
+                <a:t>Entrega</a:t>
+              </a:r>
+              <a:endParaRPr lang="es-ES" sz="1050" dirty="0" smtClean="0">
+                <a:solidFill>
+                  <a:schemeClr val="accent5">
+                    <a:lumMod val="40000"/>
+                    <a:lumOff val="60000"/>
+                  </a:schemeClr>
+                </a:solidFill>
+              </a:endParaRPr>
+            </a:p>
+            <a:p>
+              <a:pPr algn="ctr"/>
+              <a:r>
+                <a:rPr lang="es-ES" sz="1050" dirty="0" smtClean="0">
+                  <a:solidFill>
+                    <a:schemeClr val="accent5">
+                      <a:lumMod val="40000"/>
+                      <a:lumOff val="60000"/>
+                    </a:schemeClr>
+                  </a:solidFill>
+                </a:rPr>
+                <a:t>Bienes</a:t>
+              </a:r>
+              <a:endParaRPr lang="es-ES" sz="1050" dirty="0">
+                <a:solidFill>
+                  <a:schemeClr val="accent5">
+                    <a:lumMod val="40000"/>
+                    <a:lumOff val="60000"/>
+                  </a:schemeClr>
+                </a:solidFill>
+              </a:endParaRPr>
+            </a:p>
+          </p:txBody>
+        </p:sp>
+      </p:grpSp>
+      <p:grpSp>
+        <p:nvGrpSpPr>
+          <p:cNvPr id="35" name="Grupo 34"/>
+          <p:cNvGrpSpPr/>
+          <p:nvPr/>
+        </p:nvGrpSpPr>
+        <p:grpSpPr>
+          <a:xfrm>
+            <a:off x="826533" y="2227619"/>
+            <a:ext cx="838180" cy="430887"/>
+            <a:chOff x="826533" y="2227619"/>
+            <a:chExt cx="838180" cy="430887"/>
+          </a:xfrm>
+        </p:grpSpPr>
+        <p:pic>
+          <p:nvPicPr>
+            <p:cNvPr id="32" name="23 Imagen"/>
+            <p:cNvPicPr>
+              <a:picLocks noChangeAspect="1"/>
+            </p:cNvPicPr>
+            <p:nvPr/>
+          </p:nvPicPr>
+          <p:blipFill>
+            <a:blip r:embed="rId7">
+              <a:extLst>
+                <a:ext uri="{28A0092B-C50C-407E-A947-70E740481C1C}">
+                  <a14:useLocalDpi xmlns:a14="http://schemas.microsoft.com/office/drawing/2010/main" val="0"/>
+                </a:ext>
+              </a:extLst>
+            </a:blip>
+            <a:stretch>
+              <a:fillRect/>
+            </a:stretch>
+          </p:blipFill>
+          <p:spPr>
+            <a:xfrm>
+              <a:off x="826533" y="2255758"/>
+              <a:ext cx="772624" cy="387360"/>
+            </a:xfrm>
+            <a:prstGeom prst="rect">
+              <a:avLst/>
+            </a:prstGeom>
+          </p:spPr>
+        </p:pic>
+        <p:sp>
+          <p:nvSpPr>
+            <p:cNvPr id="33" name="5 CuadroTexto"/>
+            <p:cNvSpPr txBox="1"/>
+            <p:nvPr/>
+          </p:nvSpPr>
+          <p:spPr>
+            <a:xfrm>
+              <a:off x="971896" y="2227619"/>
+              <a:ext cx="692817" cy="430887"/>
+            </a:xfrm>
+            <a:prstGeom prst="rect">
+              <a:avLst/>
+            </a:prstGeom>
+            <a:noFill/>
+          </p:spPr>
+          <p:txBody>
+            <a:bodyPr wrap="none" rtlCol="0">
+              <a:spAutoFit/>
+            </a:bodyPr>
+            <a:lstStyle/>
+            <a:p>
+              <a:pPr algn="ctr"/>
+              <a:r>
+                <a:rPr lang="es-ES" sz="1100" dirty="0" smtClean="0">
+                  <a:solidFill>
+                    <a:schemeClr val="accent5">
+                      <a:lumMod val="40000"/>
+                      <a:lumOff val="60000"/>
+                    </a:schemeClr>
+                  </a:solidFill>
+                </a:rPr>
+                <a:t>Retornar</a:t>
+              </a:r>
+              <a:endParaRPr lang="es-ES" sz="1100" dirty="0" smtClean="0">
+                <a:solidFill>
+                  <a:schemeClr val="accent5">
+                    <a:lumMod val="40000"/>
+                    <a:lumOff val="60000"/>
+                  </a:schemeClr>
+                </a:solidFill>
+              </a:endParaRPr>
+            </a:p>
+            <a:p>
+              <a:pPr algn="ctr"/>
+              <a:r>
+                <a:rPr lang="es-ES" sz="1100" dirty="0">
+                  <a:solidFill>
+                    <a:schemeClr val="accent5">
+                      <a:lumMod val="40000"/>
+                      <a:lumOff val="60000"/>
+                    </a:schemeClr>
+                  </a:solidFill>
+                </a:rPr>
+                <a:t>a</a:t>
+              </a:r>
+              <a:r>
+                <a:rPr lang="es-ES" sz="1100" dirty="0" smtClean="0">
+                  <a:solidFill>
+                    <a:schemeClr val="accent5">
+                      <a:lumMod val="40000"/>
+                      <a:lumOff val="60000"/>
+                    </a:schemeClr>
+                  </a:solidFill>
+                </a:rPr>
+                <a:t> Origen</a:t>
+              </a:r>
+              <a:endParaRPr lang="es-ES" sz="1100" dirty="0">
+                <a:solidFill>
+                  <a:schemeClr val="accent5">
+                    <a:lumMod val="40000"/>
+                    <a:lumOff val="60000"/>
+                  </a:schemeClr>
+                </a:solidFill>
+              </a:endParaRPr>
+            </a:p>
+          </p:txBody>
+        </p:sp>
+        <p:sp>
+          <p:nvSpPr>
+            <p:cNvPr id="34" name="Flecha derecha 33"/>
+            <p:cNvSpPr/>
+            <p:nvPr/>
+          </p:nvSpPr>
+          <p:spPr>
+            <a:xfrm rot="16200000">
+              <a:off x="841082" y="2335775"/>
+              <a:ext cx="234699" cy="206877"/>
+            </a:xfrm>
+            <a:prstGeom prst="rightArrow">
+              <a:avLst/>
+            </a:prstGeom>
+            <a:solidFill>
+              <a:schemeClr val="accent6">
+                <a:lumMod val="75000"/>
+              </a:schemeClr>
+            </a:solidFill>
+            <a:ln>
+              <a:solidFill>
+                <a:schemeClr val="bg1">
+                  <a:lumMod val="95000"/>
+                </a:schemeClr>
+              </a:solidFill>
+            </a:ln>
+          </p:spPr>
+          <p:style>
+            <a:lnRef idx="2">
+              <a:schemeClr val="accent1">
+                <a:shade val="50000"/>
+              </a:schemeClr>
+            </a:lnRef>
+            <a:fillRef idx="1">
+              <a:schemeClr val="accent1"/>
+            </a:fillRef>
+            <a:effectRef idx="0">
+              <a:schemeClr val="accent1"/>
+            </a:effectRef>
+            <a:fontRef idx="minor">
+              <a:schemeClr val="lt1"/>
+            </a:fontRef>
+          </p:style>
+          <p:txBody>
+            <a:bodyPr rtlCol="0" anchor="ctr"/>
+            <a:lstStyle/>
+            <a:p>
+              <a:pPr algn="ctr"/>
+              <a:endParaRPr lang="es-ES"/>
+            </a:p>
+          </p:txBody>
+        </p:sp>
+      </p:grpSp>
     </p:spTree>
     <p:extLst>
       <p:ext uri="{BB962C8B-B14F-4D97-AF65-F5344CB8AC3E}">

</xml_diff>

<commit_message>
Carga de codigo 27/11/2022
</commit_message>
<xml_diff>
--- a/imagenes/Botones.pptx
+++ b/imagenes/Botones.pptx
@@ -307,7 +307,7 @@
           <a:p>
             <a:fld id="{9BF2B8FD-2FE0-4DE2-9F61-7CBDFB79DE84}" type="datetimeFigureOut">
               <a:rPr lang="es-ES" smtClean="0"/>
-              <a:t>18/11/2022</a:t>
+              <a:t>25/11/2022</a:t>
             </a:fld>
             <a:endParaRPr lang="es-ES"/>
           </a:p>
@@ -477,7 +477,7 @@
           <a:p>
             <a:fld id="{9BF2B8FD-2FE0-4DE2-9F61-7CBDFB79DE84}" type="datetimeFigureOut">
               <a:rPr lang="es-ES" smtClean="0"/>
-              <a:t>18/11/2022</a:t>
+              <a:t>25/11/2022</a:t>
             </a:fld>
             <a:endParaRPr lang="es-ES"/>
           </a:p>
@@ -657,7 +657,7 @@
           <a:p>
             <a:fld id="{9BF2B8FD-2FE0-4DE2-9F61-7CBDFB79DE84}" type="datetimeFigureOut">
               <a:rPr lang="es-ES" smtClean="0"/>
-              <a:t>18/11/2022</a:t>
+              <a:t>25/11/2022</a:t>
             </a:fld>
             <a:endParaRPr lang="es-ES"/>
           </a:p>
@@ -827,7 +827,7 @@
           <a:p>
             <a:fld id="{9BF2B8FD-2FE0-4DE2-9F61-7CBDFB79DE84}" type="datetimeFigureOut">
               <a:rPr lang="es-ES" smtClean="0"/>
-              <a:t>18/11/2022</a:t>
+              <a:t>25/11/2022</a:t>
             </a:fld>
             <a:endParaRPr lang="es-ES"/>
           </a:p>
@@ -1073,7 +1073,7 @@
           <a:p>
             <a:fld id="{9BF2B8FD-2FE0-4DE2-9F61-7CBDFB79DE84}" type="datetimeFigureOut">
               <a:rPr lang="es-ES" smtClean="0"/>
-              <a:t>18/11/2022</a:t>
+              <a:t>25/11/2022</a:t>
             </a:fld>
             <a:endParaRPr lang="es-ES"/>
           </a:p>
@@ -1361,7 +1361,7 @@
           <a:p>
             <a:fld id="{9BF2B8FD-2FE0-4DE2-9F61-7CBDFB79DE84}" type="datetimeFigureOut">
               <a:rPr lang="es-ES" smtClean="0"/>
-              <a:t>18/11/2022</a:t>
+              <a:t>25/11/2022</a:t>
             </a:fld>
             <a:endParaRPr lang="es-ES"/>
           </a:p>
@@ -1783,7 +1783,7 @@
           <a:p>
             <a:fld id="{9BF2B8FD-2FE0-4DE2-9F61-7CBDFB79DE84}" type="datetimeFigureOut">
               <a:rPr lang="es-ES" smtClean="0"/>
-              <a:t>18/11/2022</a:t>
+              <a:t>25/11/2022</a:t>
             </a:fld>
             <a:endParaRPr lang="es-ES"/>
           </a:p>
@@ -1901,7 +1901,7 @@
           <a:p>
             <a:fld id="{9BF2B8FD-2FE0-4DE2-9F61-7CBDFB79DE84}" type="datetimeFigureOut">
               <a:rPr lang="es-ES" smtClean="0"/>
-              <a:t>18/11/2022</a:t>
+              <a:t>25/11/2022</a:t>
             </a:fld>
             <a:endParaRPr lang="es-ES"/>
           </a:p>
@@ -1996,7 +1996,7 @@
           <a:p>
             <a:fld id="{9BF2B8FD-2FE0-4DE2-9F61-7CBDFB79DE84}" type="datetimeFigureOut">
               <a:rPr lang="es-ES" smtClean="0"/>
-              <a:t>18/11/2022</a:t>
+              <a:t>25/11/2022</a:t>
             </a:fld>
             <a:endParaRPr lang="es-ES"/>
           </a:p>
@@ -2273,7 +2273,7 @@
           <a:p>
             <a:fld id="{9BF2B8FD-2FE0-4DE2-9F61-7CBDFB79DE84}" type="datetimeFigureOut">
               <a:rPr lang="es-ES" smtClean="0"/>
-              <a:t>18/11/2022</a:t>
+              <a:t>25/11/2022</a:t>
             </a:fld>
             <a:endParaRPr lang="es-ES"/>
           </a:p>
@@ -2526,7 +2526,7 @@
           <a:p>
             <a:fld id="{9BF2B8FD-2FE0-4DE2-9F61-7CBDFB79DE84}" type="datetimeFigureOut">
               <a:rPr lang="es-ES" smtClean="0"/>
-              <a:t>18/11/2022</a:t>
+              <a:t>25/11/2022</a:t>
             </a:fld>
             <a:endParaRPr lang="es-ES"/>
           </a:p>
@@ -2739,7 +2739,7 @@
           <a:p>
             <a:fld id="{9BF2B8FD-2FE0-4DE2-9F61-7CBDFB79DE84}" type="datetimeFigureOut">
               <a:rPr lang="es-ES" smtClean="0"/>
-              <a:t>18/11/2022</a:t>
+              <a:t>25/11/2022</a:t>
             </a:fld>
             <a:endParaRPr lang="es-ES"/>
           </a:p>
@@ -11539,14 +11539,6 @@
                 </a:rPr>
                 <a:t>Entrega</a:t>
               </a:r>
-              <a:endParaRPr lang="es-ES" sz="1050" dirty="0" smtClean="0">
-                <a:solidFill>
-                  <a:schemeClr val="accent5">
-                    <a:lumMod val="40000"/>
-                    <a:lumOff val="60000"/>
-                  </a:schemeClr>
-                </a:solidFill>
-              </a:endParaRPr>
             </a:p>
             <a:p>
               <a:pPr algn="ctr"/>
@@ -11651,14 +11643,6 @@
                 </a:rPr>
                 <a:t>Retornar</a:t>
               </a:r>
-              <a:endParaRPr lang="es-ES" sz="1100" dirty="0" smtClean="0">
-                <a:solidFill>
-                  <a:schemeClr val="accent5">
-                    <a:lumMod val="40000"/>
-                    <a:lumOff val="60000"/>
-                  </a:schemeClr>
-                </a:solidFill>
-              </a:endParaRPr>
             </a:p>
             <a:p>
               <a:pPr algn="ctr"/>
@@ -11744,6 +11728,328 @@
             <a:p>
               <a:pPr algn="ctr"/>
               <a:endParaRPr lang="es-ES"/>
+            </a:p>
+          </p:txBody>
+        </p:sp>
+      </p:grpSp>
+      <p:grpSp>
+        <p:nvGrpSpPr>
+          <p:cNvPr id="26" name="Grupo 25"/>
+          <p:cNvGrpSpPr/>
+          <p:nvPr/>
+        </p:nvGrpSpPr>
+        <p:grpSpPr>
+          <a:xfrm>
+            <a:off x="6712808" y="2325963"/>
+            <a:ext cx="953274" cy="461665"/>
+            <a:chOff x="6712808" y="2325963"/>
+            <a:chExt cx="953274" cy="461665"/>
+          </a:xfrm>
+        </p:grpSpPr>
+        <p:pic>
+          <p:nvPicPr>
+            <p:cNvPr id="37" name="23 Imagen"/>
+            <p:cNvPicPr>
+              <a:picLocks noChangeAspect="1"/>
+            </p:cNvPicPr>
+            <p:nvPr/>
+          </p:nvPicPr>
+          <p:blipFill>
+            <a:blip r:embed="rId7">
+              <a:extLst>
+                <a:ext uri="{28A0092B-C50C-407E-A947-70E740481C1C}">
+                  <a14:useLocalDpi xmlns:a14="http://schemas.microsoft.com/office/drawing/2010/main" val="0"/>
+                </a:ext>
+              </a:extLst>
+            </a:blip>
+            <a:stretch>
+              <a:fillRect/>
+            </a:stretch>
+          </p:blipFill>
+          <p:spPr>
+            <a:xfrm>
+              <a:off x="6762045" y="2366980"/>
+              <a:ext cx="898759" cy="371475"/>
+            </a:xfrm>
+            <a:prstGeom prst="rect">
+              <a:avLst/>
+            </a:prstGeom>
+          </p:spPr>
+        </p:pic>
+        <p:sp>
+          <p:nvSpPr>
+            <p:cNvPr id="38" name="Flecha derecha 37"/>
+            <p:cNvSpPr/>
+            <p:nvPr/>
+          </p:nvSpPr>
+          <p:spPr>
+            <a:xfrm>
+              <a:off x="7329967" y="2385670"/>
+              <a:ext cx="258169" cy="206877"/>
+            </a:xfrm>
+            <a:prstGeom prst="rightArrow">
+              <a:avLst/>
+            </a:prstGeom>
+            <a:solidFill>
+              <a:srgbClr val="00B050"/>
+            </a:solidFill>
+            <a:ln>
+              <a:solidFill>
+                <a:schemeClr val="bg1">
+                  <a:lumMod val="95000"/>
+                </a:schemeClr>
+              </a:solidFill>
+            </a:ln>
+          </p:spPr>
+          <p:style>
+            <a:lnRef idx="2">
+              <a:schemeClr val="accent1">
+                <a:shade val="50000"/>
+              </a:schemeClr>
+            </a:lnRef>
+            <a:fillRef idx="1">
+              <a:schemeClr val="accent1"/>
+            </a:fillRef>
+            <a:effectRef idx="0">
+              <a:schemeClr val="accent1"/>
+            </a:effectRef>
+            <a:fontRef idx="minor">
+              <a:schemeClr val="lt1"/>
+            </a:fontRef>
+          </p:style>
+          <p:txBody>
+            <a:bodyPr rtlCol="0" anchor="ctr"/>
+            <a:lstStyle/>
+            <a:p>
+              <a:pPr algn="ctr"/>
+              <a:endParaRPr lang="es-ES"/>
+            </a:p>
+          </p:txBody>
+        </p:sp>
+        <p:sp>
+          <p:nvSpPr>
+            <p:cNvPr id="40" name="5 CuadroTexto"/>
+            <p:cNvSpPr txBox="1"/>
+            <p:nvPr/>
+          </p:nvSpPr>
+          <p:spPr>
+            <a:xfrm>
+              <a:off x="6712808" y="2325963"/>
+              <a:ext cx="953274" cy="461665"/>
+            </a:xfrm>
+            <a:prstGeom prst="rect">
+              <a:avLst/>
+            </a:prstGeom>
+            <a:noFill/>
+          </p:spPr>
+          <p:txBody>
+            <a:bodyPr wrap="none" rtlCol="0">
+              <a:spAutoFit/>
+            </a:bodyPr>
+            <a:lstStyle/>
+            <a:p>
+              <a:r>
+                <a:rPr lang="es-ES" sz="1200" dirty="0" smtClean="0">
+                  <a:solidFill>
+                    <a:schemeClr val="accent5">
+                      <a:lumMod val="40000"/>
+                      <a:lumOff val="60000"/>
+                    </a:schemeClr>
+                  </a:solidFill>
+                </a:rPr>
+                <a:t>Genera</a:t>
+              </a:r>
+              <a:endParaRPr lang="es-ES" sz="1200" dirty="0" smtClean="0">
+                <a:solidFill>
+                  <a:schemeClr val="accent5">
+                    <a:lumMod val="40000"/>
+                    <a:lumOff val="60000"/>
+                  </a:schemeClr>
+                </a:solidFill>
+              </a:endParaRPr>
+            </a:p>
+            <a:p>
+              <a:r>
+                <a:rPr lang="es-ES" sz="1200" dirty="0" smtClean="0">
+                  <a:solidFill>
+                    <a:schemeClr val="accent5">
+                      <a:lumMod val="40000"/>
+                      <a:lumOff val="60000"/>
+                    </a:schemeClr>
+                  </a:solidFill>
+                </a:rPr>
+                <a:t>Cronograma</a:t>
+              </a:r>
+              <a:endParaRPr lang="es-ES" sz="1200" dirty="0">
+                <a:solidFill>
+                  <a:schemeClr val="accent5">
+                    <a:lumMod val="40000"/>
+                    <a:lumOff val="60000"/>
+                  </a:schemeClr>
+                </a:solidFill>
+              </a:endParaRPr>
+            </a:p>
+          </p:txBody>
+        </p:sp>
+      </p:grpSp>
+      <p:grpSp>
+        <p:nvGrpSpPr>
+          <p:cNvPr id="41" name="Grupo 40"/>
+          <p:cNvGrpSpPr/>
+          <p:nvPr/>
+        </p:nvGrpSpPr>
+        <p:grpSpPr>
+          <a:xfrm>
+            <a:off x="5142330" y="2318019"/>
+            <a:ext cx="953274" cy="461665"/>
+            <a:chOff x="6752563" y="2325967"/>
+            <a:chExt cx="953274" cy="461665"/>
+          </a:xfrm>
+        </p:grpSpPr>
+        <p:pic>
+          <p:nvPicPr>
+            <p:cNvPr id="42" name="23 Imagen"/>
+            <p:cNvPicPr>
+              <a:picLocks noChangeAspect="1"/>
+            </p:cNvPicPr>
+            <p:nvPr/>
+          </p:nvPicPr>
+          <p:blipFill>
+            <a:blip r:embed="rId7">
+              <a:extLst>
+                <a:ext uri="{28A0092B-C50C-407E-A947-70E740481C1C}">
+                  <a14:useLocalDpi xmlns:a14="http://schemas.microsoft.com/office/drawing/2010/main" val="0"/>
+                </a:ext>
+              </a:extLst>
+            </a:blip>
+            <a:stretch>
+              <a:fillRect/>
+            </a:stretch>
+          </p:blipFill>
+          <p:spPr>
+            <a:xfrm>
+              <a:off x="6762045" y="2366980"/>
+              <a:ext cx="898759" cy="371475"/>
+            </a:xfrm>
+            <a:prstGeom prst="rect">
+              <a:avLst/>
+            </a:prstGeom>
+          </p:spPr>
+        </p:pic>
+        <p:sp>
+          <p:nvSpPr>
+            <p:cNvPr id="43" name="Flecha derecha 42"/>
+            <p:cNvSpPr/>
+            <p:nvPr/>
+          </p:nvSpPr>
+          <p:spPr>
+            <a:xfrm>
+              <a:off x="6848726" y="2385670"/>
+              <a:ext cx="234699" cy="206877"/>
+            </a:xfrm>
+            <a:prstGeom prst="rightArrow">
+              <a:avLst/>
+            </a:prstGeom>
+            <a:solidFill>
+              <a:srgbClr val="00B050"/>
+            </a:solidFill>
+            <a:ln>
+              <a:solidFill>
+                <a:schemeClr val="bg1">
+                  <a:lumMod val="95000"/>
+                </a:schemeClr>
+              </a:solidFill>
+            </a:ln>
+          </p:spPr>
+          <p:style>
+            <a:lnRef idx="2">
+              <a:schemeClr val="accent1">
+                <a:shade val="50000"/>
+              </a:schemeClr>
+            </a:lnRef>
+            <a:fillRef idx="1">
+              <a:schemeClr val="accent1"/>
+            </a:fillRef>
+            <a:effectRef idx="0">
+              <a:schemeClr val="accent1"/>
+            </a:effectRef>
+            <a:fontRef idx="minor">
+              <a:schemeClr val="lt1"/>
+            </a:fontRef>
+          </p:style>
+          <p:txBody>
+            <a:bodyPr rtlCol="0" anchor="ctr"/>
+            <a:lstStyle/>
+            <a:p>
+              <a:pPr algn="ctr"/>
+              <a:endParaRPr lang="es-ES"/>
+            </a:p>
+          </p:txBody>
+        </p:sp>
+        <p:sp>
+          <p:nvSpPr>
+            <p:cNvPr id="44" name="5 CuadroTexto"/>
+            <p:cNvSpPr txBox="1"/>
+            <p:nvPr/>
+          </p:nvSpPr>
+          <p:spPr>
+            <a:xfrm>
+              <a:off x="6752563" y="2325967"/>
+              <a:ext cx="953274" cy="461665"/>
+            </a:xfrm>
+            <a:prstGeom prst="rect">
+              <a:avLst/>
+            </a:prstGeom>
+            <a:noFill/>
+          </p:spPr>
+          <p:txBody>
+            <a:bodyPr wrap="none" rtlCol="0">
+              <a:spAutoFit/>
+            </a:bodyPr>
+            <a:lstStyle/>
+            <a:p>
+              <a:pPr algn="r"/>
+              <a:r>
+                <a:rPr lang="es-ES" sz="1200" dirty="0" smtClean="0">
+                  <a:solidFill>
+                    <a:schemeClr val="accent5">
+                      <a:lumMod val="40000"/>
+                      <a:lumOff val="60000"/>
+                    </a:schemeClr>
+                  </a:solidFill>
+                </a:rPr>
+                <a:t>Genera</a:t>
+              </a:r>
+              <a:endParaRPr lang="es-ES" sz="1200" dirty="0" smtClean="0">
+                <a:solidFill>
+                  <a:schemeClr val="accent5">
+                    <a:lumMod val="40000"/>
+                    <a:lumOff val="60000"/>
+                  </a:schemeClr>
+                </a:solidFill>
+              </a:endParaRPr>
+            </a:p>
+            <a:p>
+              <a:pPr algn="r"/>
+              <a:r>
+                <a:rPr lang="es-ES" sz="1200" dirty="0" smtClean="0">
+                  <a:solidFill>
+                    <a:schemeClr val="accent5">
+                      <a:lumMod val="40000"/>
+                      <a:lumOff val="60000"/>
+                    </a:schemeClr>
+                  </a:solidFill>
+                </a:rPr>
+                <a:t>Cronograma</a:t>
+              </a:r>
+              <a:endParaRPr lang="es-ES" sz="1200" dirty="0">
+                <a:solidFill>
+                  <a:schemeClr val="accent5">
+                    <a:lumMod val="40000"/>
+                    <a:lumOff val="60000"/>
+                  </a:schemeClr>
+                </a:solidFill>
+              </a:endParaRPr>
             </a:p>
           </p:txBody>
         </p:sp>

</xml_diff>

<commit_message>
Carga de codigo 2022/12/12
</commit_message>
<xml_diff>
--- a/imagenes/Botones.pptx
+++ b/imagenes/Botones.pptx
@@ -307,7 +307,7 @@
           <a:p>
             <a:fld id="{9BF2B8FD-2FE0-4DE2-9F61-7CBDFB79DE84}" type="datetimeFigureOut">
               <a:rPr lang="es-ES" smtClean="0"/>
-              <a:t>25/11/2022</a:t>
+              <a:t>10/12/2022</a:t>
             </a:fld>
             <a:endParaRPr lang="es-ES"/>
           </a:p>
@@ -477,7 +477,7 @@
           <a:p>
             <a:fld id="{9BF2B8FD-2FE0-4DE2-9F61-7CBDFB79DE84}" type="datetimeFigureOut">
               <a:rPr lang="es-ES" smtClean="0"/>
-              <a:t>25/11/2022</a:t>
+              <a:t>10/12/2022</a:t>
             </a:fld>
             <a:endParaRPr lang="es-ES"/>
           </a:p>
@@ -657,7 +657,7 @@
           <a:p>
             <a:fld id="{9BF2B8FD-2FE0-4DE2-9F61-7CBDFB79DE84}" type="datetimeFigureOut">
               <a:rPr lang="es-ES" smtClean="0"/>
-              <a:t>25/11/2022</a:t>
+              <a:t>10/12/2022</a:t>
             </a:fld>
             <a:endParaRPr lang="es-ES"/>
           </a:p>
@@ -827,7 +827,7 @@
           <a:p>
             <a:fld id="{9BF2B8FD-2FE0-4DE2-9F61-7CBDFB79DE84}" type="datetimeFigureOut">
               <a:rPr lang="es-ES" smtClean="0"/>
-              <a:t>25/11/2022</a:t>
+              <a:t>10/12/2022</a:t>
             </a:fld>
             <a:endParaRPr lang="es-ES"/>
           </a:p>
@@ -1073,7 +1073,7 @@
           <a:p>
             <a:fld id="{9BF2B8FD-2FE0-4DE2-9F61-7CBDFB79DE84}" type="datetimeFigureOut">
               <a:rPr lang="es-ES" smtClean="0"/>
-              <a:t>25/11/2022</a:t>
+              <a:t>10/12/2022</a:t>
             </a:fld>
             <a:endParaRPr lang="es-ES"/>
           </a:p>
@@ -1361,7 +1361,7 @@
           <a:p>
             <a:fld id="{9BF2B8FD-2FE0-4DE2-9F61-7CBDFB79DE84}" type="datetimeFigureOut">
               <a:rPr lang="es-ES" smtClean="0"/>
-              <a:t>25/11/2022</a:t>
+              <a:t>10/12/2022</a:t>
             </a:fld>
             <a:endParaRPr lang="es-ES"/>
           </a:p>
@@ -1783,7 +1783,7 @@
           <a:p>
             <a:fld id="{9BF2B8FD-2FE0-4DE2-9F61-7CBDFB79DE84}" type="datetimeFigureOut">
               <a:rPr lang="es-ES" smtClean="0"/>
-              <a:t>25/11/2022</a:t>
+              <a:t>10/12/2022</a:t>
             </a:fld>
             <a:endParaRPr lang="es-ES"/>
           </a:p>
@@ -1901,7 +1901,7 @@
           <a:p>
             <a:fld id="{9BF2B8FD-2FE0-4DE2-9F61-7CBDFB79DE84}" type="datetimeFigureOut">
               <a:rPr lang="es-ES" smtClean="0"/>
-              <a:t>25/11/2022</a:t>
+              <a:t>10/12/2022</a:t>
             </a:fld>
             <a:endParaRPr lang="es-ES"/>
           </a:p>
@@ -1996,7 +1996,7 @@
           <a:p>
             <a:fld id="{9BF2B8FD-2FE0-4DE2-9F61-7CBDFB79DE84}" type="datetimeFigureOut">
               <a:rPr lang="es-ES" smtClean="0"/>
-              <a:t>25/11/2022</a:t>
+              <a:t>10/12/2022</a:t>
             </a:fld>
             <a:endParaRPr lang="es-ES"/>
           </a:p>
@@ -2273,7 +2273,7 @@
           <a:p>
             <a:fld id="{9BF2B8FD-2FE0-4DE2-9F61-7CBDFB79DE84}" type="datetimeFigureOut">
               <a:rPr lang="es-ES" smtClean="0"/>
-              <a:t>25/11/2022</a:t>
+              <a:t>10/12/2022</a:t>
             </a:fld>
             <a:endParaRPr lang="es-ES"/>
           </a:p>
@@ -2526,7 +2526,7 @@
           <a:p>
             <a:fld id="{9BF2B8FD-2FE0-4DE2-9F61-7CBDFB79DE84}" type="datetimeFigureOut">
               <a:rPr lang="es-ES" smtClean="0"/>
-              <a:t>25/11/2022</a:t>
+              <a:t>10/12/2022</a:t>
             </a:fld>
             <a:endParaRPr lang="es-ES"/>
           </a:p>
@@ -2739,7 +2739,7 @@
           <a:p>
             <a:fld id="{9BF2B8FD-2FE0-4DE2-9F61-7CBDFB79DE84}" type="datetimeFigureOut">
               <a:rPr lang="es-ES" smtClean="0"/>
-              <a:t>25/11/2022</a:t>
+              <a:t>10/12/2022</a:t>
             </a:fld>
             <a:endParaRPr lang="es-ES"/>
           </a:p>
@@ -10630,7 +10630,7 @@
         </p:blipFill>
         <p:spPr>
           <a:xfrm>
-            <a:off x="4171950" y="3243262"/>
+            <a:off x="881039" y="1276137"/>
             <a:ext cx="800100" cy="371475"/>
           </a:xfrm>
           <a:prstGeom prst="rect">
@@ -11859,14 +11859,6 @@
                 </a:rPr>
                 <a:t>Genera</a:t>
               </a:r>
-              <a:endParaRPr lang="es-ES" sz="1200" dirty="0" smtClean="0">
-                <a:solidFill>
-                  <a:schemeClr val="accent5">
-                    <a:lumMod val="40000"/>
-                    <a:lumOff val="60000"/>
-                  </a:schemeClr>
-                </a:solidFill>
-              </a:endParaRPr>
             </a:p>
             <a:p>
               <a:r>
@@ -12020,14 +12012,6 @@
                 </a:rPr>
                 <a:t>Genera</a:t>
               </a:r>
-              <a:endParaRPr lang="es-ES" sz="1200" dirty="0" smtClean="0">
-                <a:solidFill>
-                  <a:schemeClr val="accent5">
-                    <a:lumMod val="40000"/>
-                    <a:lumOff val="60000"/>
-                  </a:schemeClr>
-                </a:solidFill>
-              </a:endParaRPr>
             </a:p>
             <a:p>
               <a:pPr algn="r"/>
@@ -12041,6 +12025,232 @@
                   </a:solidFill>
                 </a:rPr>
                 <a:t>Cronograma</a:t>
+              </a:r>
+              <a:endParaRPr lang="es-ES" sz="1200" dirty="0">
+                <a:solidFill>
+                  <a:schemeClr val="accent5">
+                    <a:lumMod val="40000"/>
+                    <a:lumOff val="60000"/>
+                  </a:schemeClr>
+                </a:solidFill>
+              </a:endParaRPr>
+            </a:p>
+          </p:txBody>
+        </p:sp>
+      </p:grpSp>
+      <p:pic>
+        <p:nvPicPr>
+          <p:cNvPr id="48" name="Imagen 47"/>
+          <p:cNvPicPr>
+            <a:picLocks noChangeAspect="1"/>
+          </p:cNvPicPr>
+          <p:nvPr/>
+        </p:nvPicPr>
+        <p:blipFill>
+          <a:blip r:embed="rId11">
+            <a:extLst>
+              <a:ext uri="{28A0092B-C50C-407E-A947-70E740481C1C}">
+                <a14:useLocalDpi xmlns:a14="http://schemas.microsoft.com/office/drawing/2010/main" val="0"/>
+              </a:ext>
+            </a:extLst>
+          </a:blip>
+          <a:stretch>
+            <a:fillRect/>
+          </a:stretch>
+        </p:blipFill>
+        <p:spPr>
+          <a:xfrm>
+            <a:off x="1982995" y="2910934"/>
+            <a:ext cx="838200" cy="371475"/>
+          </a:xfrm>
+          <a:prstGeom prst="rect">
+            <a:avLst/>
+          </a:prstGeom>
+        </p:spPr>
+      </p:pic>
+      <p:sp>
+        <p:nvSpPr>
+          <p:cNvPr id="49" name="5 CuadroTexto"/>
+          <p:cNvSpPr txBox="1"/>
+          <p:nvPr/>
+        </p:nvSpPr>
+        <p:spPr>
+          <a:xfrm>
+            <a:off x="2234500" y="2960811"/>
+            <a:ext cx="587574" cy="253916"/>
+          </a:xfrm>
+          <a:prstGeom prst="rect">
+            <a:avLst/>
+          </a:prstGeom>
+          <a:noFill/>
+        </p:spPr>
+        <p:txBody>
+          <a:bodyPr wrap="none" rtlCol="0">
+            <a:spAutoFit/>
+          </a:bodyPr>
+          <a:lstStyle/>
+          <a:p>
+            <a:r>
+              <a:rPr lang="es-ES" sz="1050" dirty="0" smtClean="0">
+                <a:solidFill>
+                  <a:schemeClr val="tx2">
+                    <a:lumMod val="75000"/>
+                  </a:schemeClr>
+                </a:solidFill>
+              </a:rPr>
+              <a:t>Verificar</a:t>
+            </a:r>
+            <a:endParaRPr lang="es-ES" sz="1050" dirty="0">
+              <a:solidFill>
+                <a:schemeClr val="tx2">
+                  <a:lumMod val="75000"/>
+                </a:schemeClr>
+              </a:solidFill>
+            </a:endParaRPr>
+          </a:p>
+        </p:txBody>
+      </p:sp>
+      <p:grpSp>
+        <p:nvGrpSpPr>
+          <p:cNvPr id="36" name="Grupo 35"/>
+          <p:cNvGrpSpPr/>
+          <p:nvPr/>
+        </p:nvGrpSpPr>
+        <p:grpSpPr>
+          <a:xfrm>
+            <a:off x="3405871" y="3642407"/>
+            <a:ext cx="931731" cy="461665"/>
+            <a:chOff x="3405871" y="3642407"/>
+            <a:chExt cx="931731" cy="461665"/>
+          </a:xfrm>
+        </p:grpSpPr>
+        <p:grpSp>
+          <p:nvGrpSpPr>
+            <p:cNvPr id="31" name="Grupo 30"/>
+            <p:cNvGrpSpPr/>
+            <p:nvPr/>
+          </p:nvGrpSpPr>
+          <p:grpSpPr>
+            <a:xfrm>
+              <a:off x="3405871" y="3692813"/>
+              <a:ext cx="904875" cy="373371"/>
+              <a:chOff x="3405871" y="3692813"/>
+              <a:chExt cx="904875" cy="373371"/>
+            </a:xfrm>
+          </p:grpSpPr>
+          <p:pic>
+            <p:nvPicPr>
+              <p:cNvPr id="16" name="Imagen 15"/>
+              <p:cNvPicPr>
+                <a:picLocks noChangeAspect="1"/>
+              </p:cNvPicPr>
+              <p:nvPr/>
+            </p:nvPicPr>
+            <p:blipFill>
+              <a:blip r:embed="rId12"/>
+              <a:stretch>
+                <a:fillRect/>
+              </a:stretch>
+            </p:blipFill>
+            <p:spPr>
+              <a:xfrm>
+                <a:off x="3405871" y="3692813"/>
+                <a:ext cx="904875" cy="371475"/>
+              </a:xfrm>
+              <a:prstGeom prst="rect">
+                <a:avLst/>
+              </a:prstGeom>
+            </p:spPr>
+          </p:pic>
+          <p:pic>
+            <p:nvPicPr>
+              <p:cNvPr id="45" name="12 Imagen"/>
+              <p:cNvPicPr>
+                <a:picLocks noChangeAspect="1"/>
+              </p:cNvPicPr>
+              <p:nvPr/>
+            </p:nvPicPr>
+            <p:blipFill>
+              <a:blip r:embed="rId7">
+                <a:extLst>
+                  <a:ext uri="{28A0092B-C50C-407E-A947-70E740481C1C}">
+                    <a14:useLocalDpi xmlns:a14="http://schemas.microsoft.com/office/drawing/2010/main" val="0"/>
+                  </a:ext>
+                </a:extLst>
+              </a:blip>
+              <a:stretch>
+                <a:fillRect/>
+              </a:stretch>
+            </p:blipFill>
+            <p:spPr>
+              <a:xfrm>
+                <a:off x="3771850" y="3694709"/>
+                <a:ext cx="530835" cy="371475"/>
+              </a:xfrm>
+              <a:prstGeom prst="rect">
+                <a:avLst/>
+              </a:prstGeom>
+            </p:spPr>
+          </p:pic>
+        </p:grpSp>
+        <p:sp>
+          <p:nvSpPr>
+            <p:cNvPr id="51" name="5 CuadroTexto"/>
+            <p:cNvSpPr txBox="1"/>
+            <p:nvPr/>
+          </p:nvSpPr>
+          <p:spPr>
+            <a:xfrm>
+              <a:off x="3741028" y="3642407"/>
+              <a:ext cx="596574" cy="461665"/>
+            </a:xfrm>
+            <a:prstGeom prst="rect">
+              <a:avLst/>
+            </a:prstGeom>
+            <a:noFill/>
+          </p:spPr>
+          <p:txBody>
+            <a:bodyPr wrap="none" rtlCol="0">
+              <a:spAutoFit/>
+            </a:bodyPr>
+            <a:lstStyle/>
+            <a:p>
+              <a:pPr algn="r"/>
+              <a:r>
+                <a:rPr lang="es-ES" sz="1200" dirty="0" err="1" smtClean="0">
+                  <a:solidFill>
+                    <a:schemeClr val="accent5">
+                      <a:lumMod val="40000"/>
+                      <a:lumOff val="60000"/>
+                    </a:schemeClr>
+                  </a:solidFill>
+                </a:rPr>
+                <a:t>Conta</a:t>
+              </a:r>
+              <a:r>
+                <a:rPr lang="es-ES" sz="1200" dirty="0" smtClean="0">
+                  <a:solidFill>
+                    <a:schemeClr val="accent5">
+                      <a:lumMod val="40000"/>
+                      <a:lumOff val="60000"/>
+                    </a:schemeClr>
+                  </a:solidFill>
+                </a:rPr>
+                <a:t>-</a:t>
+              </a:r>
+            </a:p>
+            <a:p>
+              <a:pPr algn="r"/>
+              <a:r>
+                <a:rPr lang="es-ES" sz="1200" dirty="0" err="1" smtClean="0">
+                  <a:solidFill>
+                    <a:schemeClr val="accent5">
+                      <a:lumMod val="40000"/>
+                      <a:lumOff val="60000"/>
+                    </a:schemeClr>
+                  </a:solidFill>
+                </a:rPr>
+                <a:t>bilizar</a:t>
               </a:r>
               <a:endParaRPr lang="es-ES" sz="1200" dirty="0">
                 <a:solidFill>

</xml_diff>

<commit_message>
Carga de codigo 19/12/2022
</commit_message>
<xml_diff>
--- a/imagenes/Botones.pptx
+++ b/imagenes/Botones.pptx
@@ -307,7 +307,7 @@
           <a:p>
             <a:fld id="{9BF2B8FD-2FE0-4DE2-9F61-7CBDFB79DE84}" type="datetimeFigureOut">
               <a:rPr lang="es-ES" smtClean="0"/>
-              <a:t>10/12/2022</a:t>
+              <a:t>16/12/2022</a:t>
             </a:fld>
             <a:endParaRPr lang="es-ES"/>
           </a:p>
@@ -477,7 +477,7 @@
           <a:p>
             <a:fld id="{9BF2B8FD-2FE0-4DE2-9F61-7CBDFB79DE84}" type="datetimeFigureOut">
               <a:rPr lang="es-ES" smtClean="0"/>
-              <a:t>10/12/2022</a:t>
+              <a:t>16/12/2022</a:t>
             </a:fld>
             <a:endParaRPr lang="es-ES"/>
           </a:p>
@@ -657,7 +657,7 @@
           <a:p>
             <a:fld id="{9BF2B8FD-2FE0-4DE2-9F61-7CBDFB79DE84}" type="datetimeFigureOut">
               <a:rPr lang="es-ES" smtClean="0"/>
-              <a:t>10/12/2022</a:t>
+              <a:t>16/12/2022</a:t>
             </a:fld>
             <a:endParaRPr lang="es-ES"/>
           </a:p>
@@ -827,7 +827,7 @@
           <a:p>
             <a:fld id="{9BF2B8FD-2FE0-4DE2-9F61-7CBDFB79DE84}" type="datetimeFigureOut">
               <a:rPr lang="es-ES" smtClean="0"/>
-              <a:t>10/12/2022</a:t>
+              <a:t>16/12/2022</a:t>
             </a:fld>
             <a:endParaRPr lang="es-ES"/>
           </a:p>
@@ -1073,7 +1073,7 @@
           <a:p>
             <a:fld id="{9BF2B8FD-2FE0-4DE2-9F61-7CBDFB79DE84}" type="datetimeFigureOut">
               <a:rPr lang="es-ES" smtClean="0"/>
-              <a:t>10/12/2022</a:t>
+              <a:t>16/12/2022</a:t>
             </a:fld>
             <a:endParaRPr lang="es-ES"/>
           </a:p>
@@ -1361,7 +1361,7 @@
           <a:p>
             <a:fld id="{9BF2B8FD-2FE0-4DE2-9F61-7CBDFB79DE84}" type="datetimeFigureOut">
               <a:rPr lang="es-ES" smtClean="0"/>
-              <a:t>10/12/2022</a:t>
+              <a:t>16/12/2022</a:t>
             </a:fld>
             <a:endParaRPr lang="es-ES"/>
           </a:p>
@@ -1783,7 +1783,7 @@
           <a:p>
             <a:fld id="{9BF2B8FD-2FE0-4DE2-9F61-7CBDFB79DE84}" type="datetimeFigureOut">
               <a:rPr lang="es-ES" smtClean="0"/>
-              <a:t>10/12/2022</a:t>
+              <a:t>16/12/2022</a:t>
             </a:fld>
             <a:endParaRPr lang="es-ES"/>
           </a:p>
@@ -1901,7 +1901,7 @@
           <a:p>
             <a:fld id="{9BF2B8FD-2FE0-4DE2-9F61-7CBDFB79DE84}" type="datetimeFigureOut">
               <a:rPr lang="es-ES" smtClean="0"/>
-              <a:t>10/12/2022</a:t>
+              <a:t>16/12/2022</a:t>
             </a:fld>
             <a:endParaRPr lang="es-ES"/>
           </a:p>
@@ -1996,7 +1996,7 @@
           <a:p>
             <a:fld id="{9BF2B8FD-2FE0-4DE2-9F61-7CBDFB79DE84}" type="datetimeFigureOut">
               <a:rPr lang="es-ES" smtClean="0"/>
-              <a:t>10/12/2022</a:t>
+              <a:t>16/12/2022</a:t>
             </a:fld>
             <a:endParaRPr lang="es-ES"/>
           </a:p>
@@ -2273,7 +2273,7 @@
           <a:p>
             <a:fld id="{9BF2B8FD-2FE0-4DE2-9F61-7CBDFB79DE84}" type="datetimeFigureOut">
               <a:rPr lang="es-ES" smtClean="0"/>
-              <a:t>10/12/2022</a:t>
+              <a:t>16/12/2022</a:t>
             </a:fld>
             <a:endParaRPr lang="es-ES"/>
           </a:p>
@@ -2526,7 +2526,7 @@
           <a:p>
             <a:fld id="{9BF2B8FD-2FE0-4DE2-9F61-7CBDFB79DE84}" type="datetimeFigureOut">
               <a:rPr lang="es-ES" smtClean="0"/>
-              <a:t>10/12/2022</a:t>
+              <a:t>16/12/2022</a:t>
             </a:fld>
             <a:endParaRPr lang="es-ES"/>
           </a:p>
@@ -2739,7 +2739,7 @@
           <a:p>
             <a:fld id="{9BF2B8FD-2FE0-4DE2-9F61-7CBDFB79DE84}" type="datetimeFigureOut">
               <a:rPr lang="es-ES" smtClean="0"/>
-              <a:t>10/12/2022</a:t>
+              <a:t>16/12/2022</a:t>
             </a:fld>
             <a:endParaRPr lang="es-ES"/>
           </a:p>
@@ -12264,6 +12264,149 @@
           </p:txBody>
         </p:sp>
       </p:grpSp>
+      <p:grpSp>
+        <p:nvGrpSpPr>
+          <p:cNvPr id="47" name="Grupo 46"/>
+          <p:cNvGrpSpPr/>
+          <p:nvPr/>
+        </p:nvGrpSpPr>
+        <p:grpSpPr>
+          <a:xfrm>
+            <a:off x="5166529" y="4060691"/>
+            <a:ext cx="1011211" cy="461665"/>
+            <a:chOff x="5166529" y="4060691"/>
+            <a:chExt cx="1011211" cy="461665"/>
+          </a:xfrm>
+        </p:grpSpPr>
+        <p:pic>
+          <p:nvPicPr>
+            <p:cNvPr id="39" name="Imagen 38"/>
+            <p:cNvPicPr>
+              <a:picLocks noChangeAspect="1"/>
+            </p:cNvPicPr>
+            <p:nvPr/>
+          </p:nvPicPr>
+          <p:blipFill>
+            <a:blip r:embed="rId13"/>
+            <a:stretch>
+              <a:fillRect/>
+            </a:stretch>
+          </p:blipFill>
+          <p:spPr>
+            <a:xfrm>
+              <a:off x="5166529" y="4121381"/>
+              <a:ext cx="904875" cy="371475"/>
+            </a:xfrm>
+            <a:prstGeom prst="rect">
+              <a:avLst/>
+            </a:prstGeom>
+          </p:spPr>
+        </p:pic>
+        <p:grpSp>
+          <p:nvGrpSpPr>
+            <p:cNvPr id="46" name="Grupo 45"/>
+            <p:cNvGrpSpPr/>
+            <p:nvPr/>
+          </p:nvGrpSpPr>
+          <p:grpSpPr>
+            <a:xfrm>
+              <a:off x="5395153" y="4060691"/>
+              <a:ext cx="782587" cy="461665"/>
+              <a:chOff x="5395153" y="3548896"/>
+              <a:chExt cx="782587" cy="461665"/>
+            </a:xfrm>
+          </p:grpSpPr>
+          <p:pic>
+            <p:nvPicPr>
+              <p:cNvPr id="50" name="12 Imagen"/>
+              <p:cNvPicPr>
+                <a:picLocks noChangeAspect="1"/>
+              </p:cNvPicPr>
+              <p:nvPr/>
+            </p:nvPicPr>
+            <p:blipFill>
+              <a:blip r:embed="rId7">
+                <a:extLst>
+                  <a:ext uri="{28A0092B-C50C-407E-A947-70E740481C1C}">
+                    <a14:useLocalDpi xmlns:a14="http://schemas.microsoft.com/office/drawing/2010/main" val="0"/>
+                  </a:ext>
+                </a:extLst>
+              </a:blip>
+              <a:stretch>
+                <a:fillRect/>
+              </a:stretch>
+            </p:blipFill>
+            <p:spPr>
+              <a:xfrm>
+                <a:off x="5483340" y="3607643"/>
+                <a:ext cx="612264" cy="371475"/>
+              </a:xfrm>
+              <a:prstGeom prst="rect">
+                <a:avLst/>
+              </a:prstGeom>
+            </p:spPr>
+          </p:pic>
+          <p:sp>
+            <p:nvSpPr>
+              <p:cNvPr id="52" name="5 CuadroTexto"/>
+              <p:cNvSpPr txBox="1"/>
+              <p:nvPr/>
+            </p:nvSpPr>
+            <p:spPr>
+              <a:xfrm>
+                <a:off x="5395153" y="3548896"/>
+                <a:ext cx="782587" cy="461665"/>
+              </a:xfrm>
+              <a:prstGeom prst="rect">
+                <a:avLst/>
+              </a:prstGeom>
+              <a:noFill/>
+            </p:spPr>
+            <p:txBody>
+              <a:bodyPr wrap="square" rtlCol="0">
+                <a:spAutoFit/>
+              </a:bodyPr>
+              <a:lstStyle/>
+              <a:p>
+                <a:pPr algn="ctr"/>
+                <a:r>
+                  <a:rPr lang="es-ES" sz="1200" dirty="0" smtClean="0">
+                    <a:solidFill>
+                      <a:schemeClr val="accent5">
+                        <a:lumMod val="40000"/>
+                        <a:lumOff val="60000"/>
+                      </a:schemeClr>
+                    </a:solidFill>
+                  </a:rPr>
+                  <a:t>Fecha de</a:t>
+                </a:r>
+              </a:p>
+              <a:p>
+                <a:pPr algn="ctr"/>
+                <a:r>
+                  <a:rPr lang="es-ES" sz="1200" dirty="0" smtClean="0">
+                    <a:solidFill>
+                      <a:schemeClr val="accent5">
+                        <a:lumMod val="40000"/>
+                        <a:lumOff val="60000"/>
+                      </a:schemeClr>
+                    </a:solidFill>
+                  </a:rPr>
+                  <a:t>Ejecución</a:t>
+                </a:r>
+                <a:endParaRPr lang="es-ES" sz="1200" dirty="0">
+                  <a:solidFill>
+                    <a:schemeClr val="accent5">
+                      <a:lumMod val="40000"/>
+                      <a:lumOff val="60000"/>
+                    </a:schemeClr>
+                  </a:solidFill>
+                </a:endParaRPr>
+              </a:p>
+            </p:txBody>
+          </p:sp>
+        </p:grpSp>
+      </p:grpSp>
     </p:spTree>
     <p:extLst>
       <p:ext uri="{BB962C8B-B14F-4D97-AF65-F5344CB8AC3E}">

</xml_diff>